<commit_message>
add the progress presentation v1 : [include the functional presentation]
</commit_message>
<xml_diff>
--- a/Progress' Presentations/Presentation1.pptx
+++ b/Progress' Presentations/Presentation1.pptx
@@ -6173,8 +6173,8 @@
         </p:nvSpPr>
         <p:spPr>
           <a:xfrm>
-            <a:off x="7287784" y="5127844"/>
-            <a:ext cx="1758480" cy="461665"/>
+            <a:off x="7306864" y="5127844"/>
+            <a:ext cx="1739400" cy="461665"/>
           </a:xfrm>
           <a:prstGeom prst="rect">
             <a:avLst/>
@@ -6496,6 +6496,295 @@
               <a:t>Data Processed</a:t>
             </a:r>
             <a:endParaRPr lang="fr-FR" sz="1100" i="1" dirty="0">
+              <a:solidFill>
+                <a:schemeClr val="bg2">
+                  <a:lumMod val="50000"/>
+                </a:schemeClr>
+              </a:solidFill>
+              <a:latin typeface="Times New Roman" panose="02020603050405020304" pitchFamily="18" charset="0"/>
+              <a:cs typeface="Times New Roman" panose="02020603050405020304" pitchFamily="18" charset="0"/>
+            </a:endParaRPr>
+          </a:p>
+        </p:txBody>
+      </p:sp>
+      <p:pic>
+        <p:nvPicPr>
+          <p:cNvPr id="106" name="Image 105">
+            <a:extLst>
+              <a:ext uri="{FF2B5EF4-FFF2-40B4-BE49-F238E27FC236}">
+                <a16:creationId xmlns:a16="http://schemas.microsoft.com/office/drawing/2014/main" id="{E52F6E6D-751B-44E8-BCD8-27D1F153EB6B}"/>
+              </a:ext>
+            </a:extLst>
+          </p:cNvPr>
+          <p:cNvPicPr>
+            <a:picLocks noChangeAspect="1"/>
+          </p:cNvPicPr>
+          <p:nvPr/>
+        </p:nvPicPr>
+        <p:blipFill rotWithShape="1">
+          <a:blip r:embed="rId14"/>
+          <a:srcRect l="84782" t="30361" r="5224" b="52581"/>
+          <a:stretch/>
+        </p:blipFill>
+        <p:spPr>
+          <a:xfrm>
+            <a:off x="10073359" y="3797761"/>
+            <a:ext cx="1218481" cy="1086697"/>
+          </a:xfrm>
+          <a:prstGeom prst="rect">
+            <a:avLst/>
+          </a:prstGeom>
+        </p:spPr>
+      </p:pic>
+      <p:pic>
+        <p:nvPicPr>
+          <p:cNvPr id="107" name="Image 106">
+            <a:extLst>
+              <a:ext uri="{FF2B5EF4-FFF2-40B4-BE49-F238E27FC236}">
+                <a16:creationId xmlns:a16="http://schemas.microsoft.com/office/drawing/2014/main" id="{917AE612-D6C4-4C17-BCC9-DB46191C1955}"/>
+              </a:ext>
+            </a:extLst>
+          </p:cNvPr>
+          <p:cNvPicPr>
+            <a:picLocks noChangeAspect="1"/>
+          </p:cNvPicPr>
+          <p:nvPr/>
+        </p:nvPicPr>
+        <p:blipFill>
+          <a:blip r:embed="rId15">
+            <a:duotone>
+              <a:schemeClr val="accent6">
+                <a:shade val="45000"/>
+                <a:satMod val="135000"/>
+              </a:schemeClr>
+              <a:prstClr val="white"/>
+            </a:duotone>
+            <a:extLst>
+              <a:ext uri="{28A0092B-C50C-407E-A947-70E740481C1C}">
+                <a14:useLocalDpi xmlns:a14="http://schemas.microsoft.com/office/drawing/2010/main" val="0"/>
+              </a:ext>
+            </a:extLst>
+          </a:blip>
+          <a:stretch>
+            <a:fillRect/>
+          </a:stretch>
+        </p:blipFill>
+        <p:spPr>
+          <a:xfrm>
+            <a:off x="1984896" y="4497587"/>
+            <a:ext cx="365760" cy="365760"/>
+          </a:xfrm>
+          <a:prstGeom prst="rect">
+            <a:avLst/>
+          </a:prstGeom>
+        </p:spPr>
+      </p:pic>
+      <p:grpSp>
+        <p:nvGrpSpPr>
+          <p:cNvPr id="112" name="Groupe 111">
+            <a:extLst>
+              <a:ext uri="{FF2B5EF4-FFF2-40B4-BE49-F238E27FC236}">
+                <a16:creationId xmlns:a16="http://schemas.microsoft.com/office/drawing/2014/main" id="{084E12FB-6072-4D1B-8A8E-08B79D6985A6}"/>
+              </a:ext>
+            </a:extLst>
+          </p:cNvPr>
+          <p:cNvGrpSpPr/>
+          <p:nvPr/>
+        </p:nvGrpSpPr>
+        <p:grpSpPr>
+          <a:xfrm>
+            <a:off x="10143480" y="2579795"/>
+            <a:ext cx="1005840" cy="923123"/>
+            <a:chOff x="10129872" y="2694183"/>
+            <a:chExt cx="1005840" cy="923123"/>
+          </a:xfrm>
+        </p:grpSpPr>
+        <p:pic>
+          <p:nvPicPr>
+            <p:cNvPr id="111" name="Image 110">
+              <a:extLst>
+                <a:ext uri="{FF2B5EF4-FFF2-40B4-BE49-F238E27FC236}">
+                  <a16:creationId xmlns:a16="http://schemas.microsoft.com/office/drawing/2014/main" id="{F9F44E37-A095-4841-898F-616914884404}"/>
+                </a:ext>
+              </a:extLst>
+            </p:cNvPr>
+            <p:cNvPicPr>
+              <a:picLocks noChangeAspect="1"/>
+            </p:cNvPicPr>
+            <p:nvPr/>
+          </p:nvPicPr>
+          <p:blipFill rotWithShape="1">
+            <a:blip r:embed="rId16">
+              <a:extLst>
+                <a:ext uri="{28A0092B-C50C-407E-A947-70E740481C1C}">
+                  <a14:useLocalDpi xmlns:a14="http://schemas.microsoft.com/office/drawing/2010/main" val="0"/>
+                </a:ext>
+              </a:extLst>
+            </a:blip>
+            <a:srcRect l="7734" t="28385" b="32698"/>
+            <a:stretch/>
+          </p:blipFill>
+          <p:spPr>
+            <a:xfrm>
+              <a:off x="10129872" y="2698481"/>
+              <a:ext cx="1005840" cy="918825"/>
+            </a:xfrm>
+            <a:prstGeom prst="roundRect">
+              <a:avLst/>
+            </a:prstGeom>
+          </p:spPr>
+        </p:pic>
+        <p:pic>
+          <p:nvPicPr>
+            <p:cNvPr id="109" name="Image 108">
+              <a:extLst>
+                <a:ext uri="{FF2B5EF4-FFF2-40B4-BE49-F238E27FC236}">
+                  <a16:creationId xmlns:a16="http://schemas.microsoft.com/office/drawing/2014/main" id="{A5CBD3D5-095B-4374-B027-D85512C7D7BB}"/>
+                </a:ext>
+              </a:extLst>
+            </p:cNvPr>
+            <p:cNvPicPr>
+              <a:picLocks noChangeAspect="1"/>
+            </p:cNvPicPr>
+            <p:nvPr/>
+          </p:nvPicPr>
+          <p:blipFill>
+            <a:blip r:embed="rId17">
+              <a:extLst>
+                <a:ext uri="{BEBA8EAE-BF5A-486C-A8C5-ECC9F3942E4B}">
+                  <a14:imgProps xmlns:a14="http://schemas.microsoft.com/office/drawing/2010/main">
+                    <a14:imgLayer r:embed="rId18">
+                      <a14:imgEffect>
+                        <a14:sharpenSoften amount="14000"/>
+                      </a14:imgEffect>
+                      <a14:imgEffect>
+                        <a14:brightnessContrast bright="-3000"/>
+                      </a14:imgEffect>
+                    </a14:imgLayer>
+                  </a14:imgProps>
+                </a:ext>
+                <a:ext uri="{28A0092B-C50C-407E-A947-70E740481C1C}">
+                  <a14:useLocalDpi xmlns:a14="http://schemas.microsoft.com/office/drawing/2010/main" val="0"/>
+                </a:ext>
+              </a:extLst>
+            </a:blip>
+            <a:stretch>
+              <a:fillRect/>
+            </a:stretch>
+          </p:blipFill>
+          <p:spPr>
+            <a:xfrm>
+              <a:off x="10129872" y="2694183"/>
+              <a:ext cx="1005840" cy="923123"/>
+            </a:xfrm>
+            <a:prstGeom prst="roundRect">
+              <a:avLst/>
+            </a:prstGeom>
+            <a:effectLst>
+              <a:outerShdw sx="200000" sy="200000" algn="ctr" rotWithShape="0">
+                <a:srgbClr val="000000">
+                  <a:alpha val="0"/>
+                </a:srgbClr>
+              </a:outerShdw>
+            </a:effectLst>
+          </p:spPr>
+        </p:pic>
+      </p:grpSp>
+      <p:sp>
+        <p:nvSpPr>
+          <p:cNvPr id="115" name="ZoneTexte 114">
+            <a:extLst>
+              <a:ext uri="{FF2B5EF4-FFF2-40B4-BE49-F238E27FC236}">
+                <a16:creationId xmlns:a16="http://schemas.microsoft.com/office/drawing/2014/main" id="{FB179D2B-9DFD-42A9-9BA1-B47DF591D4D6}"/>
+              </a:ext>
+            </a:extLst>
+          </p:cNvPr>
+          <p:cNvSpPr txBox="1"/>
+          <p:nvPr/>
+        </p:nvSpPr>
+        <p:spPr>
+          <a:xfrm>
+            <a:off x="10086883" y="4921697"/>
+            <a:ext cx="1178598" cy="461665"/>
+          </a:xfrm>
+          <a:prstGeom prst="rect">
+            <a:avLst/>
+          </a:prstGeom>
+          <a:noFill/>
+        </p:spPr>
+        <p:txBody>
+          <a:bodyPr wrap="square" rtlCol="0">
+            <a:spAutoFit/>
+          </a:bodyPr>
+          <a:lstStyle/>
+          <a:p>
+            <a:pPr algn="ctr"/>
+            <a:r>
+              <a:rPr lang="en-US" sz="1200" dirty="0">
+                <a:solidFill>
+                  <a:schemeClr val="bg2">
+                    <a:lumMod val="50000"/>
+                  </a:schemeClr>
+                </a:solidFill>
+                <a:latin typeface="Times New Roman" panose="02020603050405020304" pitchFamily="18" charset="0"/>
+                <a:cs typeface="Times New Roman" panose="02020603050405020304" pitchFamily="18" charset="0"/>
+              </a:rPr>
+              <a:t>Dashboard, Reports</a:t>
+            </a:r>
+            <a:endParaRPr lang="fr-FR" sz="1200" dirty="0">
+              <a:solidFill>
+                <a:schemeClr val="bg2">
+                  <a:lumMod val="50000"/>
+                </a:schemeClr>
+              </a:solidFill>
+              <a:latin typeface="Times New Roman" panose="02020603050405020304" pitchFamily="18" charset="0"/>
+              <a:cs typeface="Times New Roman" panose="02020603050405020304" pitchFamily="18" charset="0"/>
+            </a:endParaRPr>
+          </a:p>
+        </p:txBody>
+      </p:sp>
+      <p:sp>
+        <p:nvSpPr>
+          <p:cNvPr id="116" name="ZoneTexte 115">
+            <a:extLst>
+              <a:ext uri="{FF2B5EF4-FFF2-40B4-BE49-F238E27FC236}">
+                <a16:creationId xmlns:a16="http://schemas.microsoft.com/office/drawing/2014/main" id="{13C88A31-1067-45AB-9E06-7499E9688D0B}"/>
+              </a:ext>
+            </a:extLst>
+          </p:cNvPr>
+          <p:cNvSpPr txBox="1"/>
+          <p:nvPr/>
+        </p:nvSpPr>
+        <p:spPr>
+          <a:xfrm>
+            <a:off x="10086883" y="3512782"/>
+            <a:ext cx="1178598" cy="276999"/>
+          </a:xfrm>
+          <a:prstGeom prst="rect">
+            <a:avLst/>
+          </a:prstGeom>
+          <a:noFill/>
+        </p:spPr>
+        <p:txBody>
+          <a:bodyPr wrap="square" rtlCol="0">
+            <a:spAutoFit/>
+          </a:bodyPr>
+          <a:lstStyle/>
+          <a:p>
+            <a:pPr algn="ctr"/>
+            <a:r>
+              <a:rPr lang="en-US" sz="1200" dirty="0">
+                <a:solidFill>
+                  <a:schemeClr val="bg2">
+                    <a:lumMod val="50000"/>
+                  </a:schemeClr>
+                </a:solidFill>
+                <a:latin typeface="Times New Roman" panose="02020603050405020304" pitchFamily="18" charset="0"/>
+                <a:cs typeface="Times New Roman" panose="02020603050405020304" pitchFamily="18" charset="0"/>
+              </a:rPr>
+              <a:t>Heatmap</a:t>
+            </a:r>
+            <a:endParaRPr lang="fr-FR" sz="1200" dirty="0">
               <a:solidFill>
                 <a:schemeClr val="bg2">
                   <a:lumMod val="50000"/>

</xml_diff>